<commit_message>
Updated with in class patches
</commit_message>
<xml_diff>
--- a/fall_2022/presentations/Digital Audio Power Point.pptx
+++ b/fall_2022/presentations/Digital Audio Power Point.pptx
@@ -6550,7 +6550,7 @@
             <a:fld id="{87DE6118-2437-4B30-8E3C-4D2BE6020583}" type="datetimeFigureOut">
               <a:rPr lang="en-US" dirty="0"/>
               <a:pPr/>
-              <a:t>1/26/22</a:t>
+              <a:t>8/25/22</a:t>
             </a:fld>
             <a:endParaRPr lang="en-US" dirty="0"/>
           </a:p>
@@ -6880,7 +6880,7 @@
           <a:p>
             <a:fld id="{87DE6118-2437-4B30-8E3C-4D2BE6020583}" type="datetimeFigureOut">
               <a:rPr lang="en-US" dirty="0"/>
-              <a:t>1/26/22</a:t>
+              <a:t>8/25/22</a:t>
             </a:fld>
             <a:endParaRPr lang="en-US" dirty="0"/>
           </a:p>
@@ -7060,7 +7060,7 @@
           <a:p>
             <a:fld id="{87DE6118-2437-4B30-8E3C-4D2BE6020583}" type="datetimeFigureOut">
               <a:rPr lang="en-US" dirty="0"/>
-              <a:t>1/26/22</a:t>
+              <a:t>8/25/22</a:t>
             </a:fld>
             <a:endParaRPr lang="en-US" dirty="0"/>
           </a:p>
@@ -7476,7 +7476,7 @@
           <a:p>
             <a:fld id="{87DE6118-2437-4B30-8E3C-4D2BE6020583}" type="datetimeFigureOut">
               <a:rPr lang="en-US" dirty="0"/>
-              <a:t>1/26/22</a:t>
+              <a:t>8/25/22</a:t>
             </a:fld>
             <a:endParaRPr lang="en-US" dirty="0"/>
           </a:p>
@@ -7754,7 +7754,7 @@
             <a:fld id="{87DE6118-2437-4B30-8E3C-4D2BE6020583}" type="datetimeFigureOut">
               <a:rPr lang="en-US" dirty="0"/>
               <a:pPr/>
-              <a:t>1/26/22</a:t>
+              <a:t>8/25/22</a:t>
             </a:fld>
             <a:endParaRPr lang="en-US" dirty="0"/>
           </a:p>
@@ -8204,7 +8204,7 @@
           <a:p>
             <a:fld id="{87DE6118-2437-4B30-8E3C-4D2BE6020583}" type="datetimeFigureOut">
               <a:rPr lang="en-US" dirty="0"/>
-              <a:t>1/26/22</a:t>
+              <a:t>8/25/22</a:t>
             </a:fld>
             <a:endParaRPr lang="en-US" dirty="0"/>
           </a:p>
@@ -8681,7 +8681,7 @@
           <a:p>
             <a:fld id="{87DE6118-2437-4B30-8E3C-4D2BE6020583}" type="datetimeFigureOut">
               <a:rPr lang="en-US" dirty="0"/>
-              <a:t>1/26/22</a:t>
+              <a:t>8/25/22</a:t>
             </a:fld>
             <a:endParaRPr lang="en-US" dirty="0"/>
           </a:p>
@@ -8799,7 +8799,7 @@
           <a:p>
             <a:fld id="{87DE6118-2437-4B30-8E3C-4D2BE6020583}" type="datetimeFigureOut">
               <a:rPr lang="en-US" dirty="0"/>
-              <a:t>1/26/22</a:t>
+              <a:t>8/25/22</a:t>
             </a:fld>
             <a:endParaRPr lang="en-US" dirty="0"/>
           </a:p>
@@ -8894,7 +8894,7 @@
           <a:p>
             <a:fld id="{87DE6118-2437-4B30-8E3C-4D2BE6020583}" type="datetimeFigureOut">
               <a:rPr lang="en-US" dirty="0"/>
-              <a:t>1/26/22</a:t>
+              <a:t>8/25/22</a:t>
             </a:fld>
             <a:endParaRPr lang="en-US" dirty="0"/>
           </a:p>
@@ -9243,7 +9243,7 @@
             <a:fld id="{87DE6118-2437-4B30-8E3C-4D2BE6020583}" type="datetimeFigureOut">
               <a:rPr lang="en-US" dirty="0"/>
               <a:pPr/>
-              <a:t>1/26/22</a:t>
+              <a:t>8/25/22</a:t>
             </a:fld>
             <a:endParaRPr lang="en-US" dirty="0"/>
           </a:p>
@@ -9672,7 +9672,7 @@
             <a:fld id="{87DE6118-2437-4B30-8E3C-4D2BE6020583}" type="datetimeFigureOut">
               <a:rPr lang="en-US" dirty="0"/>
               <a:pPr/>
-              <a:t>1/26/22</a:t>
+              <a:t>8/25/22</a:t>
             </a:fld>
             <a:endParaRPr lang="en-US" dirty="0"/>
           </a:p>
@@ -9989,7 +9989,7 @@
             <a:fld id="{87DE6118-2437-4B30-8E3C-4D2BE6020583}" type="datetimeFigureOut">
               <a:rPr lang="en-US" dirty="0"/>
               <a:pPr/>
-              <a:t>1/26/22</a:t>
+              <a:t>8/25/22</a:t>
             </a:fld>
             <a:endParaRPr lang="en-US" dirty="0"/>
           </a:p>
@@ -13902,20 +13902,20 @@
           <a:lstStyle/>
           <a:p>
             <a:r>
-              <a:rPr lang="en-US"/>
+              <a:rPr lang="en-US" dirty="0"/>
               <a:t>Microphone has diaphragm with magnet attached</a:t>
             </a:r>
           </a:p>
           <a:p>
             <a:r>
-              <a:rPr lang="en-US"/>
+              <a:rPr lang="en-US" dirty="0"/>
               <a:t>As diaphragm moves “analogously” to sound, moving magnets create “analog” electronic signal</a:t>
             </a:r>
           </a:p>
           <a:p>
             <a:r>
-              <a:rPr lang="en-US"/>
-              <a:t>Signal travels down cable to magnetic tape</a:t>
+              <a:rPr lang="en-US" dirty="0"/>
+              <a:t>Signal travels down cable to magnetic tape or an audio interface</a:t>
             </a:r>
           </a:p>
         </p:txBody>

</xml_diff>